<commit_message>
Task folders changed to fit redesign
</commit_message>
<xml_diff>
--- a/Docs/AEMQ_080214.pptx
+++ b/Docs/AEMQ_080214.pptx
@@ -415,7 +415,7 @@
           <a:p>
             <a:fld id="{54A3FFD9-E774-4F96-A588-9244CFC4FE30}" type="datetimeFigureOut">
               <a:rPr lang="en-US" smtClean="0"/>
-              <a:t>8/3/2014</a:t>
+              <a:t>8/17/2014</a:t>
             </a:fld>
             <a:endParaRPr lang="en-US"/>
           </a:p>
@@ -600,7 +600,7 @@
           <a:p>
             <a:fld id="{54A3FFD9-E774-4F96-A588-9244CFC4FE30}" type="datetimeFigureOut">
               <a:rPr lang="en-US" smtClean="0"/>
-              <a:t>8/3/2014</a:t>
+              <a:t>8/17/2014</a:t>
             </a:fld>
             <a:endParaRPr lang="en-US"/>
           </a:p>
@@ -785,7 +785,7 @@
           <a:p>
             <a:fld id="{54A3FFD9-E774-4F96-A588-9244CFC4FE30}" type="datetimeFigureOut">
               <a:rPr lang="en-US" smtClean="0"/>
-              <a:t>8/3/2014</a:t>
+              <a:t>8/17/2014</a:t>
             </a:fld>
             <a:endParaRPr lang="en-US"/>
           </a:p>
@@ -970,7 +970,7 @@
           <a:p>
             <a:fld id="{54A3FFD9-E774-4F96-A588-9244CFC4FE30}" type="datetimeFigureOut">
               <a:rPr lang="en-US" smtClean="0"/>
-              <a:t>8/3/2014</a:t>
+              <a:t>8/17/2014</a:t>
             </a:fld>
             <a:endParaRPr lang="en-US"/>
           </a:p>
@@ -1351,7 +1351,7 @@
           <a:p>
             <a:fld id="{54A3FFD9-E774-4F96-A588-9244CFC4FE30}" type="datetimeFigureOut">
               <a:rPr lang="en-US" smtClean="0"/>
-              <a:t>8/3/2014</a:t>
+              <a:t>8/17/2014</a:t>
             </a:fld>
             <a:endParaRPr lang="en-US"/>
           </a:p>
@@ -1620,7 +1620,7 @@
           <a:p>
             <a:fld id="{54A3FFD9-E774-4F96-A588-9244CFC4FE30}" type="datetimeFigureOut">
               <a:rPr lang="en-US" smtClean="0"/>
-              <a:t>8/3/2014</a:t>
+              <a:t>8/17/2014</a:t>
             </a:fld>
             <a:endParaRPr lang="en-US"/>
           </a:p>
@@ -2005,7 +2005,7 @@
           <a:p>
             <a:fld id="{54A3FFD9-E774-4F96-A588-9244CFC4FE30}" type="datetimeFigureOut">
               <a:rPr lang="en-US" smtClean="0"/>
-              <a:t>8/3/2014</a:t>
+              <a:t>8/17/2014</a:t>
             </a:fld>
             <a:endParaRPr lang="en-US"/>
           </a:p>
@@ -2126,7 +2126,7 @@
           <a:p>
             <a:fld id="{54A3FFD9-E774-4F96-A588-9244CFC4FE30}" type="datetimeFigureOut">
               <a:rPr lang="en-US" smtClean="0"/>
-              <a:t>8/3/2014</a:t>
+              <a:t>8/17/2014</a:t>
             </a:fld>
             <a:endParaRPr lang="en-US"/>
           </a:p>
@@ -2306,7 +2306,7 @@
           <a:p>
             <a:fld id="{54A3FFD9-E774-4F96-A588-9244CFC4FE30}" type="datetimeFigureOut">
               <a:rPr lang="en-US" smtClean="0"/>
-              <a:t>8/3/2014</a:t>
+              <a:t>8/17/2014</a:t>
             </a:fld>
             <a:endParaRPr lang="en-US"/>
           </a:p>
@@ -2640,7 +2640,7 @@
           <a:p>
             <a:fld id="{54A3FFD9-E774-4F96-A588-9244CFC4FE30}" type="datetimeFigureOut">
               <a:rPr lang="en-US" smtClean="0"/>
-              <a:t>8/3/2014</a:t>
+              <a:t>8/17/2014</a:t>
             </a:fld>
             <a:endParaRPr lang="en-US"/>
           </a:p>
@@ -3009,7 +3009,7 @@
           <a:p>
             <a:fld id="{54A3FFD9-E774-4F96-A588-9244CFC4FE30}" type="datetimeFigureOut">
               <a:rPr lang="en-US" smtClean="0"/>
-              <a:t>8/3/2014</a:t>
+              <a:t>8/17/2014</a:t>
             </a:fld>
             <a:endParaRPr lang="en-US"/>
           </a:p>
@@ -3427,7 +3427,7 @@
           <a:p>
             <a:fld id="{54A3FFD9-E774-4F96-A588-9244CFC4FE30}" type="datetimeFigureOut">
               <a:rPr lang="en-US" smtClean="0"/>
-              <a:t>8/3/2014</a:t>
+              <a:t>8/17/2014</a:t>
             </a:fld>
             <a:endParaRPr lang="en-US"/>
           </a:p>
@@ -5465,7 +5465,7 @@
         </p:nvCxnSpPr>
         <p:spPr>
           <a:xfrm>
-            <a:off x="3276600" y="4174374"/>
+            <a:off x="3276600" y="4191000"/>
             <a:ext cx="0" cy="724594"/>
           </a:xfrm>
           <a:prstGeom prst="line">
@@ -5717,11 +5717,7 @@
             </a:pPr>
             <a:r>
               <a:rPr lang="en-US" dirty="0" smtClean="0"/>
-              <a:t>UART – Universal Asynchronous Receiver Transmitter driver </a:t>
-            </a:r>
-            <a:r>
-              <a:rPr lang="en-US" dirty="0" smtClean="0"/>
-              <a:t>service</a:t>
+              <a:t>UART – Universal Asynchronous Receiver Transmitter driver service</a:t>
             </a:r>
           </a:p>
           <a:p>
@@ -5733,7 +5729,6 @@
               <a:rPr lang="en-US" dirty="0" smtClean="0"/>
               <a:t>Range – Update range sensor information and prevent crash</a:t>
             </a:r>
-            <a:endParaRPr lang="en-US" dirty="0" smtClean="0"/>
           </a:p>
           <a:p>
             <a:pPr marL="285750" indent="-285750">
@@ -5756,11 +5751,7 @@
             </a:pPr>
             <a:r>
               <a:rPr lang="en-US" dirty="0" smtClean="0"/>
-              <a:t>Stabilize </a:t>
-            </a:r>
-            <a:r>
-              <a:rPr lang="en-US" dirty="0" smtClean="0"/>
-              <a:t>– Stabilizes the </a:t>
+              <a:t>Stabilize – Stabilizes the </a:t>
             </a:r>
             <a:r>
               <a:rPr lang="en-US" dirty="0" err="1" smtClean="0"/>

</xml_diff>